<commit_message>
Release version 3.0(update documents)
</commit_message>
<xml_diff>
--- a/BookShop(Documents)/Презентация.pptx
+++ b/BookShop(Documents)/Презентация.pptx
@@ -405,7 +405,7 @@
           <a:p>
             <a:fld id="{9C774557-7FC0-42E7-BE6D-250E8A96D865}" type="datetimeFigureOut">
               <a:rPr lang="en-US" smtClean="0"/>
-              <a:t>2/5/2022</a:t>
+              <a:t>2/14/2022</a:t>
             </a:fld>
             <a:endParaRPr lang="en-US"/>
           </a:p>
@@ -814,7 +814,7 @@
           <a:p>
             <a:fld id="{9C774557-7FC0-42E7-BE6D-250E8A96D865}" type="datetimeFigureOut">
               <a:rPr lang="en-US" smtClean="0"/>
-              <a:t>2/5/2022</a:t>
+              <a:t>2/14/2022</a:t>
             </a:fld>
             <a:endParaRPr lang="en-US"/>
           </a:p>
@@ -1145,7 +1145,7 @@
           <a:p>
             <a:fld id="{9C774557-7FC0-42E7-BE6D-250E8A96D865}" type="datetimeFigureOut">
               <a:rPr lang="en-US" smtClean="0"/>
-              <a:t>2/5/2022</a:t>
+              <a:t>2/14/2022</a:t>
             </a:fld>
             <a:endParaRPr lang="en-US"/>
           </a:p>
@@ -1545,7 +1545,7 @@
           <a:p>
             <a:fld id="{9C774557-7FC0-42E7-BE6D-250E8A96D865}" type="datetimeFigureOut">
               <a:rPr lang="en-US" smtClean="0"/>
-              <a:t>2/5/2022</a:t>
+              <a:t>2/14/2022</a:t>
             </a:fld>
             <a:endParaRPr lang="en-US"/>
           </a:p>
@@ -2108,7 +2108,7 @@
           <a:p>
             <a:fld id="{9C774557-7FC0-42E7-BE6D-250E8A96D865}" type="datetimeFigureOut">
               <a:rPr lang="en-US" smtClean="0"/>
-              <a:t>2/5/2022</a:t>
+              <a:t>2/14/2022</a:t>
             </a:fld>
             <a:endParaRPr lang="en-US"/>
           </a:p>
@@ -2784,7 +2784,7 @@
           <a:p>
             <a:fld id="{9C774557-7FC0-42E7-BE6D-250E8A96D865}" type="datetimeFigureOut">
               <a:rPr lang="en-US" smtClean="0"/>
-              <a:t>2/5/2022</a:t>
+              <a:t>2/14/2022</a:t>
             </a:fld>
             <a:endParaRPr lang="en-US"/>
           </a:p>
@@ -3692,7 +3692,7 @@
           <a:p>
             <a:fld id="{9C774557-7FC0-42E7-BE6D-250E8A96D865}" type="datetimeFigureOut">
               <a:rPr lang="en-US" smtClean="0"/>
-              <a:t>2/5/2022</a:t>
+              <a:t>2/14/2022</a:t>
             </a:fld>
             <a:endParaRPr lang="en-US"/>
           </a:p>
@@ -4000,7 +4000,7 @@
           <a:p>
             <a:fld id="{9C774557-7FC0-42E7-BE6D-250E8A96D865}" type="datetimeFigureOut">
               <a:rPr lang="en-US" smtClean="0"/>
-              <a:t>2/5/2022</a:t>
+              <a:t>2/14/2022</a:t>
             </a:fld>
             <a:endParaRPr lang="en-US"/>
           </a:p>
@@ -4259,7 +4259,7 @@
           <a:p>
             <a:fld id="{9C774557-7FC0-42E7-BE6D-250E8A96D865}" type="datetimeFigureOut">
               <a:rPr lang="en-US" smtClean="0"/>
-              <a:t>2/5/2022</a:t>
+              <a:t>2/14/2022</a:t>
             </a:fld>
             <a:endParaRPr lang="en-US"/>
           </a:p>
@@ -4577,7 +4577,7 @@
           <a:p>
             <a:fld id="{9C774557-7FC0-42E7-BE6D-250E8A96D865}" type="datetimeFigureOut">
               <a:rPr lang="en-US" smtClean="0"/>
-              <a:t>2/5/2022</a:t>
+              <a:t>2/14/2022</a:t>
             </a:fld>
             <a:endParaRPr lang="en-US"/>
           </a:p>
@@ -4961,7 +4961,7 @@
           <a:p>
             <a:fld id="{9C774557-7FC0-42E7-BE6D-250E8A96D865}" type="datetimeFigureOut">
               <a:rPr lang="en-US" smtClean="0"/>
-              <a:t>2/5/2022</a:t>
+              <a:t>2/14/2022</a:t>
             </a:fld>
             <a:endParaRPr lang="en-US"/>
           </a:p>
@@ -5332,7 +5332,7 @@
           <a:p>
             <a:fld id="{9C774557-7FC0-42E7-BE6D-250E8A96D865}" type="datetimeFigureOut">
               <a:rPr lang="en-US" smtClean="0"/>
-              <a:t>2/5/2022</a:t>
+              <a:t>2/14/2022</a:t>
             </a:fld>
             <a:endParaRPr lang="en-US"/>
           </a:p>
@@ -5833,7 +5833,7 @@
           <a:p>
             <a:fld id="{9C774557-7FC0-42E7-BE6D-250E8A96D865}" type="datetimeFigureOut">
               <a:rPr lang="en-US" smtClean="0"/>
-              <a:t>2/5/2022</a:t>
+              <a:t>2/14/2022</a:t>
             </a:fld>
             <a:endParaRPr lang="en-US"/>
           </a:p>
@@ -6085,7 +6085,7 @@
           <a:p>
             <a:fld id="{9C774557-7FC0-42E7-BE6D-250E8A96D865}" type="datetimeFigureOut">
               <a:rPr lang="en-US" smtClean="0"/>
-              <a:t>2/5/2022</a:t>
+              <a:t>2/14/2022</a:t>
             </a:fld>
             <a:endParaRPr lang="en-US"/>
           </a:p>
@@ -6243,7 +6243,7 @@
           <a:p>
             <a:fld id="{9C774557-7FC0-42E7-BE6D-250E8A96D865}" type="datetimeFigureOut">
               <a:rPr lang="en-US" smtClean="0"/>
-              <a:t>2/5/2022</a:t>
+              <a:t>2/14/2022</a:t>
             </a:fld>
             <a:endParaRPr lang="en-US"/>
           </a:p>
@@ -6628,7 +6628,7 @@
           <a:p>
             <a:fld id="{9C774557-7FC0-42E7-BE6D-250E8A96D865}" type="datetimeFigureOut">
               <a:rPr lang="en-US" smtClean="0"/>
-              <a:t>2/5/2022</a:t>
+              <a:t>2/14/2022</a:t>
             </a:fld>
             <a:endParaRPr lang="en-US"/>
           </a:p>
@@ -7032,7 +7032,7 @@
           <a:p>
             <a:fld id="{9C774557-7FC0-42E7-BE6D-250E8A96D865}" type="datetimeFigureOut">
               <a:rPr lang="en-US" smtClean="0"/>
-              <a:t>2/5/2022</a:t>
+              <a:t>2/14/2022</a:t>
             </a:fld>
             <a:endParaRPr lang="en-US"/>
           </a:p>
@@ -7271,7 +7271,7 @@
           <a:p>
             <a:fld id="{9C774557-7FC0-42E7-BE6D-250E8A96D865}" type="datetimeFigureOut">
               <a:rPr lang="en-US" smtClean="0"/>
-              <a:t>2/5/2022</a:t>
+              <a:t>2/14/2022</a:t>
             </a:fld>
             <a:endParaRPr lang="en-US"/>
           </a:p>
@@ -9609,7 +9609,7 @@
               <a:buNone/>
             </a:pPr>
             <a:r>
-              <a:rPr lang="ru-RU" altLang="en-US" sz="7200" dirty="0">
+              <a:rPr lang="ru-RU" altLang="en-US" sz="7200">
                 <a:latin typeface="Times New Roman" panose="02020603050405020304" charset="0"/>
                 <a:cs typeface="Times New Roman" panose="02020603050405020304" charset="0"/>
               </a:rPr>
@@ -9977,7 +9977,7 @@
                 <a:ea typeface="MS PGothic" panose="020B0600070205080204" pitchFamily="34" charset="-128"/>
                 <a:cs typeface="Times New Roman" panose="02020603050405020304" pitchFamily="18" charset="0"/>
               </a:rPr>
-              <a:t>-таблица </a:t>
+              <a:t>таблица </a:t>
             </a:r>
             <a:r>
               <a:rPr lang="ru-RU" sz="7200" dirty="0" err="1">
@@ -10013,15 +10013,6 @@
               </a:spcAft>
             </a:pPr>
             <a:r>
-              <a:rPr lang="en-US" sz="7200" dirty="0">
-                <a:effectLst/>
-                <a:latin typeface="Times New Roman" panose="02020603050405020304" pitchFamily="18" charset="0"/>
-                <a:ea typeface="MS PGothic" panose="020B0600070205080204" pitchFamily="34" charset="-128"/>
-                <a:cs typeface="Times New Roman" panose="02020603050405020304" pitchFamily="18" charset="0"/>
-              </a:rPr>
-              <a:t>-</a:t>
-            </a:r>
-            <a:r>
               <a:rPr lang="ru-RU" sz="7200" dirty="0">
                 <a:effectLst/>
                 <a:latin typeface="Times New Roman" panose="02020603050405020304" pitchFamily="18" charset="0"/>
@@ -10064,15 +10055,6 @@
               </a:spcAft>
             </a:pPr>
             <a:r>
-              <a:rPr lang="en-US" sz="7200" dirty="0">
-                <a:effectLst/>
-                <a:latin typeface="Times New Roman" panose="02020603050405020304" pitchFamily="18" charset="0"/>
-                <a:ea typeface="MS PGothic" panose="020B0600070205080204" pitchFamily="34" charset="-128"/>
-                <a:cs typeface="Times New Roman" panose="02020603050405020304" pitchFamily="18" charset="0"/>
-              </a:rPr>
-              <a:t>-</a:t>
-            </a:r>
-            <a:r>
               <a:rPr lang="ru-RU" sz="7200" dirty="0">
                 <a:effectLst/>
                 <a:latin typeface="Times New Roman" panose="02020603050405020304" pitchFamily="18" charset="0"/>
@@ -10114,15 +10096,6 @@
                 <a:spcPts val="800"/>
               </a:spcAft>
             </a:pPr>
-            <a:r>
-              <a:rPr lang="en-US" sz="7200" dirty="0">
-                <a:effectLst/>
-                <a:latin typeface="Times New Roman" panose="02020603050405020304" pitchFamily="18" charset="0"/>
-                <a:ea typeface="MS PGothic" panose="020B0600070205080204" pitchFamily="34" charset="-128"/>
-                <a:cs typeface="Times New Roman" panose="02020603050405020304" pitchFamily="18" charset="0"/>
-              </a:rPr>
-              <a:t>-</a:t>
-            </a:r>
             <a:r>
               <a:rPr lang="ru-RU" sz="7200" dirty="0">
                 <a:effectLst/>

</xml_diff>

<commit_message>
BookLand SuperFinal Release v5.0
</commit_message>
<xml_diff>
--- a/BookShop(Documents)/Презентация.pptx
+++ b/BookShop(Documents)/Презентация.pptx
@@ -24,7 +24,9 @@
     <p:sldId id="276" r:id="rId18"/>
     <p:sldId id="277" r:id="rId19"/>
     <p:sldId id="278" r:id="rId20"/>
-    <p:sldId id="265" r:id="rId21"/>
+    <p:sldId id="279" r:id="rId21"/>
+    <p:sldId id="280" r:id="rId22"/>
+    <p:sldId id="265" r:id="rId23"/>
   </p:sldIdLst>
   <p:sldSz cx="12192000" cy="6858000"/>
   <p:notesSz cx="6858000" cy="9144000"/>
@@ -405,7 +407,7 @@
           <a:p>
             <a:fld id="{9C774557-7FC0-42E7-BE6D-250E8A96D865}" type="datetimeFigureOut">
               <a:rPr lang="en-US" smtClean="0"/>
-              <a:t>2/14/2022</a:t>
+              <a:t>2/17/2022</a:t>
             </a:fld>
             <a:endParaRPr lang="en-US"/>
           </a:p>
@@ -814,7 +816,7 @@
           <a:p>
             <a:fld id="{9C774557-7FC0-42E7-BE6D-250E8A96D865}" type="datetimeFigureOut">
               <a:rPr lang="en-US" smtClean="0"/>
-              <a:t>2/14/2022</a:t>
+              <a:t>2/17/2022</a:t>
             </a:fld>
             <a:endParaRPr lang="en-US"/>
           </a:p>
@@ -1145,7 +1147,7 @@
           <a:p>
             <a:fld id="{9C774557-7FC0-42E7-BE6D-250E8A96D865}" type="datetimeFigureOut">
               <a:rPr lang="en-US" smtClean="0"/>
-              <a:t>2/14/2022</a:t>
+              <a:t>2/17/2022</a:t>
             </a:fld>
             <a:endParaRPr lang="en-US"/>
           </a:p>
@@ -1545,7 +1547,7 @@
           <a:p>
             <a:fld id="{9C774557-7FC0-42E7-BE6D-250E8A96D865}" type="datetimeFigureOut">
               <a:rPr lang="en-US" smtClean="0"/>
-              <a:t>2/14/2022</a:t>
+              <a:t>2/17/2022</a:t>
             </a:fld>
             <a:endParaRPr lang="en-US"/>
           </a:p>
@@ -2108,7 +2110,7 @@
           <a:p>
             <a:fld id="{9C774557-7FC0-42E7-BE6D-250E8A96D865}" type="datetimeFigureOut">
               <a:rPr lang="en-US" smtClean="0"/>
-              <a:t>2/14/2022</a:t>
+              <a:t>2/17/2022</a:t>
             </a:fld>
             <a:endParaRPr lang="en-US"/>
           </a:p>
@@ -2784,7 +2786,7 @@
           <a:p>
             <a:fld id="{9C774557-7FC0-42E7-BE6D-250E8A96D865}" type="datetimeFigureOut">
               <a:rPr lang="en-US" smtClean="0"/>
-              <a:t>2/14/2022</a:t>
+              <a:t>2/17/2022</a:t>
             </a:fld>
             <a:endParaRPr lang="en-US"/>
           </a:p>
@@ -3692,7 +3694,7 @@
           <a:p>
             <a:fld id="{9C774557-7FC0-42E7-BE6D-250E8A96D865}" type="datetimeFigureOut">
               <a:rPr lang="en-US" smtClean="0"/>
-              <a:t>2/14/2022</a:t>
+              <a:t>2/17/2022</a:t>
             </a:fld>
             <a:endParaRPr lang="en-US"/>
           </a:p>
@@ -4000,7 +4002,7 @@
           <a:p>
             <a:fld id="{9C774557-7FC0-42E7-BE6D-250E8A96D865}" type="datetimeFigureOut">
               <a:rPr lang="en-US" smtClean="0"/>
-              <a:t>2/14/2022</a:t>
+              <a:t>2/17/2022</a:t>
             </a:fld>
             <a:endParaRPr lang="en-US"/>
           </a:p>
@@ -4259,7 +4261,7 @@
           <a:p>
             <a:fld id="{9C774557-7FC0-42E7-BE6D-250E8A96D865}" type="datetimeFigureOut">
               <a:rPr lang="en-US" smtClean="0"/>
-              <a:t>2/14/2022</a:t>
+              <a:t>2/17/2022</a:t>
             </a:fld>
             <a:endParaRPr lang="en-US"/>
           </a:p>
@@ -4577,7 +4579,7 @@
           <a:p>
             <a:fld id="{9C774557-7FC0-42E7-BE6D-250E8A96D865}" type="datetimeFigureOut">
               <a:rPr lang="en-US" smtClean="0"/>
-              <a:t>2/14/2022</a:t>
+              <a:t>2/17/2022</a:t>
             </a:fld>
             <a:endParaRPr lang="en-US"/>
           </a:p>
@@ -4961,7 +4963,7 @@
           <a:p>
             <a:fld id="{9C774557-7FC0-42E7-BE6D-250E8A96D865}" type="datetimeFigureOut">
               <a:rPr lang="en-US" smtClean="0"/>
-              <a:t>2/14/2022</a:t>
+              <a:t>2/17/2022</a:t>
             </a:fld>
             <a:endParaRPr lang="en-US"/>
           </a:p>
@@ -5332,7 +5334,7 @@
           <a:p>
             <a:fld id="{9C774557-7FC0-42E7-BE6D-250E8A96D865}" type="datetimeFigureOut">
               <a:rPr lang="en-US" smtClean="0"/>
-              <a:t>2/14/2022</a:t>
+              <a:t>2/17/2022</a:t>
             </a:fld>
             <a:endParaRPr lang="en-US"/>
           </a:p>
@@ -5833,7 +5835,7 @@
           <a:p>
             <a:fld id="{9C774557-7FC0-42E7-BE6D-250E8A96D865}" type="datetimeFigureOut">
               <a:rPr lang="en-US" smtClean="0"/>
-              <a:t>2/14/2022</a:t>
+              <a:t>2/17/2022</a:t>
             </a:fld>
             <a:endParaRPr lang="en-US"/>
           </a:p>
@@ -6085,7 +6087,7 @@
           <a:p>
             <a:fld id="{9C774557-7FC0-42E7-BE6D-250E8A96D865}" type="datetimeFigureOut">
               <a:rPr lang="en-US" smtClean="0"/>
-              <a:t>2/14/2022</a:t>
+              <a:t>2/17/2022</a:t>
             </a:fld>
             <a:endParaRPr lang="en-US"/>
           </a:p>
@@ -6243,7 +6245,7 @@
           <a:p>
             <a:fld id="{9C774557-7FC0-42E7-BE6D-250E8A96D865}" type="datetimeFigureOut">
               <a:rPr lang="en-US" smtClean="0"/>
-              <a:t>2/14/2022</a:t>
+              <a:t>2/17/2022</a:t>
             </a:fld>
             <a:endParaRPr lang="en-US"/>
           </a:p>
@@ -6628,7 +6630,7 @@
           <a:p>
             <a:fld id="{9C774557-7FC0-42E7-BE6D-250E8A96D865}" type="datetimeFigureOut">
               <a:rPr lang="en-US" smtClean="0"/>
-              <a:t>2/14/2022</a:t>
+              <a:t>2/17/2022</a:t>
             </a:fld>
             <a:endParaRPr lang="en-US"/>
           </a:p>
@@ -7032,7 +7034,7 @@
           <a:p>
             <a:fld id="{9C774557-7FC0-42E7-BE6D-250E8A96D865}" type="datetimeFigureOut">
               <a:rPr lang="en-US" smtClean="0"/>
-              <a:t>2/14/2022</a:t>
+              <a:t>2/17/2022</a:t>
             </a:fld>
             <a:endParaRPr lang="en-US"/>
           </a:p>
@@ -7271,7 +7273,7 @@
           <a:p>
             <a:fld id="{9C774557-7FC0-42E7-BE6D-250E8A96D865}" type="datetimeFigureOut">
               <a:rPr lang="en-US" smtClean="0"/>
-              <a:t>2/14/2022</a:t>
+              <a:t>2/17/2022</a:t>
             </a:fld>
             <a:endParaRPr lang="en-US"/>
           </a:p>
@@ -8414,10 +8416,10 @@
       </p:sp>
       <p:pic>
         <p:nvPicPr>
-          <p:cNvPr id="13" name="Объект 12">
+          <p:cNvPr id="8" name="Объект 7">
             <a:extLst>
               <a:ext uri="{FF2B5EF4-FFF2-40B4-BE49-F238E27FC236}">
-                <a16:creationId xmlns:a16="http://schemas.microsoft.com/office/drawing/2014/main" id="{6CE0D190-FE1B-406D-B704-9B704E1445A1}"/>
+                <a16:creationId xmlns:a16="http://schemas.microsoft.com/office/drawing/2014/main" id="{4BDCF6A6-22FC-4937-98DB-9FAF8DE27D63}"/>
               </a:ext>
             </a:extLst>
           </p:cNvPr>
@@ -8442,8 +8444,8 @@
         </p:blipFill>
         <p:spPr>
           <a:xfrm>
-            <a:off x="1553013" y="2336800"/>
-            <a:ext cx="7869950" cy="3598863"/>
+            <a:off x="1610425" y="2336800"/>
+            <a:ext cx="7755125" cy="3598863"/>
           </a:xfrm>
         </p:spPr>
       </p:pic>
@@ -9046,6 +9048,194 @@
 </file>
 
 <file path=ppt/slides/slide20.xml><?xml version="1.0" encoding="utf-8"?>
+<p:sld xmlns:a="http://schemas.openxmlformats.org/drawingml/2006/main" xmlns:r="http://schemas.openxmlformats.org/officeDocument/2006/relationships" xmlns:p="http://schemas.openxmlformats.org/presentationml/2006/main">
+  <p:cSld>
+    <p:spTree>
+      <p:nvGrpSpPr>
+        <p:cNvPr id="1" name=""/>
+        <p:cNvGrpSpPr/>
+        <p:nvPr/>
+      </p:nvGrpSpPr>
+      <p:grpSpPr>
+        <a:xfrm>
+          <a:off x="0" y="0"/>
+          <a:ext cx="0" cy="0"/>
+          <a:chOff x="0" y="0"/>
+          <a:chExt cx="0" cy="0"/>
+        </a:xfrm>
+      </p:grpSpPr>
+      <p:sp>
+        <p:nvSpPr>
+          <p:cNvPr id="2" name="Заголовок 1">
+            <a:extLst>
+              <a:ext uri="{FF2B5EF4-FFF2-40B4-BE49-F238E27FC236}">
+                <a16:creationId xmlns:a16="http://schemas.microsoft.com/office/drawing/2014/main" id="{EB7A2199-992F-498D-ACFB-83D1EA1617EC}"/>
+              </a:ext>
+            </a:extLst>
+          </p:cNvPr>
+          <p:cNvSpPr>
+            <a:spLocks noGrp="1"/>
+          </p:cNvSpPr>
+          <p:nvPr>
+            <p:ph type="title"/>
+          </p:nvPr>
+        </p:nvSpPr>
+        <p:spPr/>
+        <p:txBody>
+          <a:bodyPr/>
+          <a:lstStyle/>
+          <a:p>
+            <a:r>
+              <a:rPr lang="ru-RU" dirty="0"/>
+              <a:t>Панель управления аккаунтом администратора</a:t>
+            </a:r>
+            <a:endParaRPr lang="ru-UA" dirty="0"/>
+          </a:p>
+        </p:txBody>
+      </p:sp>
+      <p:pic>
+        <p:nvPicPr>
+          <p:cNvPr id="5" name="Объект 4">
+            <a:extLst>
+              <a:ext uri="{FF2B5EF4-FFF2-40B4-BE49-F238E27FC236}">
+                <a16:creationId xmlns:a16="http://schemas.microsoft.com/office/drawing/2014/main" id="{4F8A204E-EFC4-497A-8D87-AC34A93DB351}"/>
+              </a:ext>
+            </a:extLst>
+          </p:cNvPr>
+          <p:cNvPicPr>
+            <a:picLocks noGrp="1" noChangeAspect="1"/>
+          </p:cNvPicPr>
+          <p:nvPr>
+            <p:ph idx="1"/>
+          </p:nvPr>
+        </p:nvPicPr>
+        <p:blipFill>
+          <a:blip r:embed="rId2" cstate="print">
+            <a:extLst>
+              <a:ext uri="{28A0092B-C50C-407E-A947-70E740481C1C}">
+                <a14:useLocalDpi xmlns:a14="http://schemas.microsoft.com/office/drawing/2010/main" val="0"/>
+              </a:ext>
+            </a:extLst>
+          </a:blip>
+          <a:stretch>
+            <a:fillRect/>
+          </a:stretch>
+        </p:blipFill>
+        <p:spPr>
+          <a:xfrm>
+            <a:off x="1649201" y="2336800"/>
+            <a:ext cx="7677574" cy="3598863"/>
+          </a:xfrm>
+        </p:spPr>
+      </p:pic>
+    </p:spTree>
+    <p:extLst>
+      <p:ext uri="{BB962C8B-B14F-4D97-AF65-F5344CB8AC3E}">
+        <p14:creationId xmlns:p14="http://schemas.microsoft.com/office/powerpoint/2010/main" val="660969590"/>
+      </p:ext>
+    </p:extLst>
+  </p:cSld>
+  <p:clrMapOvr>
+    <a:masterClrMapping/>
+  </p:clrMapOvr>
+</p:sld>
+</file>
+
+<file path=ppt/slides/slide21.xml><?xml version="1.0" encoding="utf-8"?>
+<p:sld xmlns:a="http://schemas.openxmlformats.org/drawingml/2006/main" xmlns:r="http://schemas.openxmlformats.org/officeDocument/2006/relationships" xmlns:p="http://schemas.openxmlformats.org/presentationml/2006/main">
+  <p:cSld>
+    <p:spTree>
+      <p:nvGrpSpPr>
+        <p:cNvPr id="1" name=""/>
+        <p:cNvGrpSpPr/>
+        <p:nvPr/>
+      </p:nvGrpSpPr>
+      <p:grpSpPr>
+        <a:xfrm>
+          <a:off x="0" y="0"/>
+          <a:ext cx="0" cy="0"/>
+          <a:chOff x="0" y="0"/>
+          <a:chExt cx="0" cy="0"/>
+        </a:xfrm>
+      </p:grpSpPr>
+      <p:sp>
+        <p:nvSpPr>
+          <p:cNvPr id="2" name="Заголовок 1">
+            <a:extLst>
+              <a:ext uri="{FF2B5EF4-FFF2-40B4-BE49-F238E27FC236}">
+                <a16:creationId xmlns:a16="http://schemas.microsoft.com/office/drawing/2014/main" id="{97D4D95B-62B1-484E-89D9-3B75A0C59D41}"/>
+              </a:ext>
+            </a:extLst>
+          </p:cNvPr>
+          <p:cNvSpPr>
+            <a:spLocks noGrp="1"/>
+          </p:cNvSpPr>
+          <p:nvPr>
+            <p:ph type="title"/>
+          </p:nvPr>
+        </p:nvSpPr>
+        <p:spPr/>
+        <p:txBody>
+          <a:bodyPr/>
+          <a:lstStyle/>
+          <a:p>
+            <a:r>
+              <a:rPr lang="ru-RU" dirty="0"/>
+              <a:t>Страница редактирования пароля аккаунта администратора</a:t>
+            </a:r>
+            <a:endParaRPr lang="ru-UA" dirty="0"/>
+          </a:p>
+        </p:txBody>
+      </p:sp>
+      <p:pic>
+        <p:nvPicPr>
+          <p:cNvPr id="5" name="Объект 4">
+            <a:extLst>
+              <a:ext uri="{FF2B5EF4-FFF2-40B4-BE49-F238E27FC236}">
+                <a16:creationId xmlns:a16="http://schemas.microsoft.com/office/drawing/2014/main" id="{2765C745-0310-4032-BFC2-783FB716116C}"/>
+              </a:ext>
+            </a:extLst>
+          </p:cNvPr>
+          <p:cNvPicPr>
+            <a:picLocks noGrp="1" noChangeAspect="1"/>
+          </p:cNvPicPr>
+          <p:nvPr>
+            <p:ph idx="1"/>
+          </p:nvPr>
+        </p:nvPicPr>
+        <p:blipFill>
+          <a:blip r:embed="rId2" cstate="print">
+            <a:extLst>
+              <a:ext uri="{28A0092B-C50C-407E-A947-70E740481C1C}">
+                <a14:useLocalDpi xmlns:a14="http://schemas.microsoft.com/office/drawing/2010/main" val="0"/>
+              </a:ext>
+            </a:extLst>
+          </a:blip>
+          <a:stretch>
+            <a:fillRect/>
+          </a:stretch>
+        </p:blipFill>
+        <p:spPr>
+          <a:xfrm>
+            <a:off x="1648934" y="2336800"/>
+            <a:ext cx="7678108" cy="3598863"/>
+          </a:xfrm>
+        </p:spPr>
+      </p:pic>
+    </p:spTree>
+    <p:extLst>
+      <p:ext uri="{BB962C8B-B14F-4D97-AF65-F5344CB8AC3E}">
+        <p14:creationId xmlns:p14="http://schemas.microsoft.com/office/powerpoint/2010/main" val="3770784341"/>
+      </p:ext>
+    </p:extLst>
+  </p:cSld>
+  <p:clrMapOvr>
+    <a:masterClrMapping/>
+  </p:clrMapOvr>
+</p:sld>
+</file>
+
+<file path=ppt/slides/slide22.xml><?xml version="1.0" encoding="utf-8"?>
 <p:sld xmlns:a="http://schemas.openxmlformats.org/drawingml/2006/main" xmlns:r="http://schemas.openxmlformats.org/officeDocument/2006/relationships" xmlns:p="http://schemas.openxmlformats.org/presentationml/2006/main">
   <p:cSld>
     <p:spTree>

</xml_diff>